<commit_message>
MCU8APPS-52247: -Updated project dependancy on bare-metal written drivers. All drivers are now configured using MCC, making the code more easily portable -NMEAParser is rewritten using a much simpler C code -Project is now assembled using XC8 compiler
</commit_message>
<xml_diff>
--- a/Documentation/GPS TRACKER ROADMAP.pptx
+++ b/Documentation/GPS TRACKER ROADMAP.pptx
@@ -112,15 +112,49 @@
       </a:defRPr>
     </a:lvl9pPr>
   </p:defaultTextStyle>
+  <p:extLst>
+    <p:ext uri="{EFAFB233-063F-42B5-8137-9DF3F51BA10A}">
+      <p15:sldGuideLst xmlns:p15="http://schemas.microsoft.com/office/powerpoint/2012/main"/>
+    </p:ext>
+  </p:extLst>
 </p:presentation>
 </file>
 
 <file path=ppt/revisionInfo.xml><?xml version="1.0" encoding="utf-8"?>
 <p1510:revInfo xmlns:a="http://schemas.openxmlformats.org/drawingml/2006/main" xmlns:r="http://schemas.openxmlformats.org/officeDocument/2006/relationships" xmlns:p1510="http://schemas.microsoft.com/office/powerpoint/2015/10/main">
   <p1510:revLst>
-    <p1510:client id="{D2249C93-377C-4504-94D5-A60F8D7B4F2C}" v="48" dt="2022-03-24T12:25:31.724"/>
+    <p1510:client id="{F28E85AD-4D48-4F86-89C1-D5380EB07187}" v="1" dt="2022-04-07T07:06:22.728"/>
   </p1510:revLst>
 </p1510:revInfo>
+</file>
+
+<file path=ppt/changesInfos/changesInfo1.xml><?xml version="1.0" encoding="utf-8"?>
+<pc:chgInfo xmlns:a="http://schemas.openxmlformats.org/drawingml/2006/main" xmlns:r="http://schemas.openxmlformats.org/officeDocument/2006/relationships" xmlns:ac="http://schemas.microsoft.com/office/drawing/2013/main/command" xmlns:pc="http://schemas.microsoft.com/office/powerpoint/2013/main/command">
+  <pc:docChgLst>
+    <pc:chgData name="Adrian Neata - M68150" userId="b5767742-2728-4cb2-917c-cdfa629d000b" providerId="ADAL" clId="{F28E85AD-4D48-4F86-89C1-D5380EB07187}"/>
+    <pc:docChg chg="modSld">
+      <pc:chgData name="Adrian Neata - M68150" userId="b5767742-2728-4cb2-917c-cdfa629d000b" providerId="ADAL" clId="{F28E85AD-4D48-4F86-89C1-D5380EB07187}" dt="2022-04-07T07:06:27.141" v="2" actId="1076"/>
+      <pc:docMkLst>
+        <pc:docMk/>
+      </pc:docMkLst>
+      <pc:sldChg chg="addSp modSp mod">
+        <pc:chgData name="Adrian Neata - M68150" userId="b5767742-2728-4cb2-917c-cdfa629d000b" providerId="ADAL" clId="{F28E85AD-4D48-4F86-89C1-D5380EB07187}" dt="2022-04-07T07:06:27.141" v="2" actId="1076"/>
+        <pc:sldMkLst>
+          <pc:docMk/>
+          <pc:sldMk cId="947736048" sldId="264"/>
+        </pc:sldMkLst>
+        <pc:spChg chg="add mod">
+          <ac:chgData name="Adrian Neata - M68150" userId="b5767742-2728-4cb2-917c-cdfa629d000b" providerId="ADAL" clId="{F28E85AD-4D48-4F86-89C1-D5380EB07187}" dt="2022-04-07T07:06:27.141" v="2" actId="1076"/>
+          <ac:spMkLst>
+            <pc:docMk/>
+            <pc:sldMk cId="947736048" sldId="264"/>
+            <ac:spMk id="3" creationId="{5806047F-C843-44AF-ADE0-445EACF796DE}"/>
+          </ac:spMkLst>
+        </pc:spChg>
+      </pc:sldChg>
+    </pc:docChg>
+  </pc:docChgLst>
+</pc:chgInfo>
 </file>
 
 <file path=ppt/diagrams/colors1.xml><?xml version="1.0" encoding="utf-8"?>
@@ -8897,7 +8931,7 @@
           <a:p>
             <a:fld id="{4EC743F4-8769-40B4-85DF-6CB8DE9F66AA}" type="datetimeFigureOut">
               <a:rPr lang="en-US" smtClean="0"/>
-              <a:t>3/24/2022</a:t>
+              <a:t>4/7/2022</a:t>
             </a:fld>
             <a:endParaRPr lang="en-US"/>
           </a:p>
@@ -9440,7 +9474,7 @@
           <a:p>
             <a:fld id="{4EC743F4-8769-40B4-85DF-6CB8DE9F66AA}" type="datetimeFigureOut">
               <a:rPr lang="en-US" smtClean="0"/>
-              <a:t>3/24/2022</a:t>
+              <a:t>4/7/2022</a:t>
             </a:fld>
             <a:endParaRPr lang="en-US"/>
           </a:p>
@@ -9648,7 +9682,7 @@
           <a:p>
             <a:fld id="{4EC743F4-8769-40B4-85DF-6CB8DE9F66AA}" type="datetimeFigureOut">
               <a:rPr lang="en-US" smtClean="0"/>
-              <a:t>3/24/2022</a:t>
+              <a:t>4/7/2022</a:t>
             </a:fld>
             <a:endParaRPr lang="en-US"/>
           </a:p>
@@ -9847,7 +9881,7 @@
           <a:p>
             <a:fld id="{4EC743F4-8769-40B4-85DF-6CB8DE9F66AA}" type="datetimeFigureOut">
               <a:rPr lang="en-US" smtClean="0"/>
-              <a:t>3/24/2022</a:t>
+              <a:t>4/7/2022</a:t>
             </a:fld>
             <a:endParaRPr lang="en-US"/>
           </a:p>
@@ -10130,7 +10164,7 @@
           <a:p>
             <a:fld id="{4EC743F4-8769-40B4-85DF-6CB8DE9F66AA}" type="datetimeFigureOut">
               <a:rPr lang="en-US" smtClean="0"/>
-              <a:t>3/24/2022</a:t>
+              <a:t>4/7/2022</a:t>
             </a:fld>
             <a:endParaRPr lang="en-US" dirty="0"/>
           </a:p>
@@ -11081,7 +11115,7 @@
           <a:p>
             <a:fld id="{4EC743F4-8769-40B4-85DF-6CB8DE9F66AA}" type="datetimeFigureOut">
               <a:rPr lang="en-US" smtClean="0"/>
-              <a:t>3/24/2022</a:t>
+              <a:t>4/7/2022</a:t>
             </a:fld>
             <a:endParaRPr lang="en-US"/>
           </a:p>
@@ -11500,7 +11534,7 @@
           <a:p>
             <a:fld id="{4EC743F4-8769-40B4-85DF-6CB8DE9F66AA}" type="datetimeFigureOut">
               <a:rPr lang="en-US" smtClean="0"/>
-              <a:t>3/24/2022</a:t>
+              <a:t>4/7/2022</a:t>
             </a:fld>
             <a:endParaRPr lang="en-US"/>
           </a:p>
@@ -11641,7 +11675,7 @@
           <a:p>
             <a:fld id="{4EC743F4-8769-40B4-85DF-6CB8DE9F66AA}" type="datetimeFigureOut">
               <a:rPr lang="en-US" smtClean="0"/>
-              <a:t>3/24/2022</a:t>
+              <a:t>4/7/2022</a:t>
             </a:fld>
             <a:endParaRPr lang="en-US"/>
           </a:p>
@@ -11754,7 +11788,7 @@
           <a:p>
             <a:fld id="{4EC743F4-8769-40B4-85DF-6CB8DE9F66AA}" type="datetimeFigureOut">
               <a:rPr lang="en-US" smtClean="0"/>
-              <a:t>3/24/2022</a:t>
+              <a:t>4/7/2022</a:t>
             </a:fld>
             <a:endParaRPr lang="en-US"/>
           </a:p>
@@ -12071,7 +12105,7 @@
           <a:p>
             <a:fld id="{4EC743F4-8769-40B4-85DF-6CB8DE9F66AA}" type="datetimeFigureOut">
               <a:rPr lang="en-US" smtClean="0"/>
-              <a:t>3/24/2022</a:t>
+              <a:t>4/7/2022</a:t>
             </a:fld>
             <a:endParaRPr lang="en-US"/>
           </a:p>
@@ -12416,7 +12450,7 @@
           <a:p>
             <a:fld id="{4EC743F4-8769-40B4-85DF-6CB8DE9F66AA}" type="datetimeFigureOut">
               <a:rPr lang="en-US" smtClean="0"/>
-              <a:t>3/24/2022</a:t>
+              <a:t>4/7/2022</a:t>
             </a:fld>
             <a:endParaRPr lang="en-US"/>
           </a:p>
@@ -12711,7 +12745,7 @@
             <a:fld id="{4EC743F4-8769-40B4-85DF-6CB8DE9F66AA}" type="datetimeFigureOut">
               <a:rPr lang="en-US" smtClean="0"/>
               <a:pPr/>
-              <a:t>3/24/2022</a:t>
+              <a:t>4/7/2022</a:t>
             </a:fld>
             <a:endParaRPr lang="en-US" dirty="0"/>
           </a:p>
@@ -17488,6 +17522,41 @@
           </a:prstGeom>
         </p:spPr>
       </p:pic>
+      <p:sp>
+        <p:nvSpPr>
+          <p:cNvPr id="3" name="TextBox 2">
+            <a:extLst>
+              <a:ext uri="{FF2B5EF4-FFF2-40B4-BE49-F238E27FC236}">
+                <a16:creationId xmlns:a16="http://schemas.microsoft.com/office/drawing/2014/main" id="{5806047F-C843-44AF-ADE0-445EACF796DE}"/>
+              </a:ext>
+            </a:extLst>
+          </p:cNvPr>
+          <p:cNvSpPr txBox="1"/>
+          <p:nvPr/>
+        </p:nvSpPr>
+        <p:spPr>
+          <a:xfrm>
+            <a:off x="50260" y="5855925"/>
+            <a:ext cx="10278968" cy="369332"/>
+          </a:xfrm>
+          <a:prstGeom prst="rect">
+            <a:avLst/>
+          </a:prstGeom>
+          <a:noFill/>
+        </p:spPr>
+        <p:txBody>
+          <a:bodyPr wrap="none" rtlCol="0">
+            <a:spAutoFit/>
+          </a:bodyPr>
+          <a:lstStyle/>
+          <a:p>
+            <a:r>
+              <a:rPr lang="en-US" dirty="0"/>
+              <a:t>https://bitbucket.microchip.com/projects/MCU8NPIAPPS/repos/gsm_tracker_internship/browse</a:t>
+            </a:r>
+          </a:p>
+        </p:txBody>
+      </p:sp>
     </p:spTree>
     <p:extLst>
       <p:ext uri="{BB962C8B-B14F-4D97-AF65-F5344CB8AC3E}">

</xml_diff>